<commit_message>
Adding more slides to deck
</commit_message>
<xml_diff>
--- a/docs/architecture/What2EatArchitecture.pptx
+++ b/docs/architecture/What2EatArchitecture.pptx
@@ -6,6 +6,10 @@
   </p:sldMasterIdLst>
   <p:sldIdLst>
     <p:sldId id="256" r:id="rId2"/>
+    <p:sldId id="258" r:id="rId3"/>
+    <p:sldId id="259" r:id="rId4"/>
+    <p:sldId id="260" r:id="rId5"/>
+    <p:sldId id="261" r:id="rId6"/>
   </p:sldIdLst>
   <p:sldSz cx="9144000" cy="6858000" type="screen4x3"/>
   <p:notesSz cx="6858000" cy="9144000"/>
@@ -3690,15 +3694,7 @@
                   <a:srgbClr val="FFB1AE"/>
                 </a:solidFill>
               </a:rPr>
-              <a:t>HTML/Bootstrap/</a:t>
-            </a:r>
-            <a:r>
-              <a:rPr lang="en-US" dirty="0" smtClean="0">
-                <a:solidFill>
-                  <a:srgbClr val="FFB1AE"/>
-                </a:solidFill>
-              </a:rPr>
-              <a:t>AngularJS</a:t>
+              <a:t>HTML/Bootstrap/AngularJS</a:t>
             </a:r>
             <a:endParaRPr lang="en-US" sz="2000" dirty="0">
               <a:solidFill>
@@ -3965,6 +3961,1747 @@
     <p:extLst>
       <p:ext uri="{BB962C8B-B14F-4D97-AF65-F5344CB8AC3E}">
         <p14:creationId xmlns:p14="http://schemas.microsoft.com/office/powerpoint/2010/main" val="2163209698"/>
+      </p:ext>
+    </p:extLst>
+  </p:cSld>
+  <p:clrMapOvr>
+    <a:masterClrMapping/>
+  </p:clrMapOvr>
+</p:sld>
+</file>
+
+<file path=ppt/slides/slide2.xml><?xml version="1.0" encoding="utf-8"?>
+<p:sld xmlns:a="http://schemas.openxmlformats.org/drawingml/2006/main" xmlns:r="http://schemas.openxmlformats.org/officeDocument/2006/relationships" xmlns:p="http://schemas.openxmlformats.org/presentationml/2006/main">
+  <p:cSld>
+    <p:spTree>
+      <p:nvGrpSpPr>
+        <p:cNvPr id="1" name=""/>
+        <p:cNvGrpSpPr/>
+        <p:nvPr/>
+      </p:nvGrpSpPr>
+      <p:grpSpPr>
+        <a:xfrm>
+          <a:off x="0" y="0"/>
+          <a:ext cx="0" cy="0"/>
+          <a:chOff x="0" y="0"/>
+          <a:chExt cx="0" cy="0"/>
+        </a:xfrm>
+      </p:grpSpPr>
+      <p:sp>
+        <p:nvSpPr>
+          <p:cNvPr id="5" name="Rectangle 4"/>
+          <p:cNvSpPr/>
+          <p:nvPr/>
+        </p:nvSpPr>
+        <p:spPr>
+          <a:xfrm>
+            <a:off x="234682" y="2471226"/>
+            <a:ext cx="5549558" cy="2871593"/>
+          </a:xfrm>
+          <a:prstGeom prst="rect">
+            <a:avLst/>
+          </a:prstGeom>
+        </p:spPr>
+        <p:style>
+          <a:lnRef idx="2">
+            <a:schemeClr val="accent4">
+              <a:shade val="50000"/>
+            </a:schemeClr>
+          </a:lnRef>
+          <a:fillRef idx="1">
+            <a:schemeClr val="accent4"/>
+          </a:fillRef>
+          <a:effectRef idx="0">
+            <a:schemeClr val="accent4"/>
+          </a:effectRef>
+          <a:fontRef idx="minor">
+            <a:schemeClr val="lt1"/>
+          </a:fontRef>
+        </p:style>
+        <p:txBody>
+          <a:bodyPr rtlCol="0" anchor="ctr"/>
+          <a:lstStyle/>
+          <a:p>
+            <a:pPr algn="ctr"/>
+            <a:endParaRPr lang="en-US" sz="2800" dirty="0"/>
+          </a:p>
+        </p:txBody>
+      </p:sp>
+      <p:sp>
+        <p:nvSpPr>
+          <p:cNvPr id="4" name="Rectangle 3"/>
+          <p:cNvSpPr/>
+          <p:nvPr/>
+        </p:nvSpPr>
+        <p:spPr>
+          <a:xfrm>
+            <a:off x="966341" y="2926810"/>
+            <a:ext cx="2912827" cy="924991"/>
+          </a:xfrm>
+          <a:prstGeom prst="rect">
+            <a:avLst/>
+          </a:prstGeom>
+          <a:ln>
+            <a:solidFill>
+              <a:srgbClr val="FFFFFF"/>
+            </a:solidFill>
+          </a:ln>
+        </p:spPr>
+        <p:style>
+          <a:lnRef idx="2">
+            <a:schemeClr val="accent1">
+              <a:shade val="50000"/>
+            </a:schemeClr>
+          </a:lnRef>
+          <a:fillRef idx="1">
+            <a:schemeClr val="accent1"/>
+          </a:fillRef>
+          <a:effectRef idx="0">
+            <a:schemeClr val="accent1"/>
+          </a:effectRef>
+          <a:fontRef idx="minor">
+            <a:schemeClr val="lt1"/>
+          </a:fontRef>
+        </p:style>
+        <p:txBody>
+          <a:bodyPr rtlCol="0" anchor="ctr"/>
+          <a:lstStyle/>
+          <a:p>
+            <a:pPr algn="ctr"/>
+            <a:endParaRPr lang="en-US" sz="2000" dirty="0"/>
+          </a:p>
+        </p:txBody>
+      </p:sp>
+      <p:sp>
+        <p:nvSpPr>
+          <p:cNvPr id="6" name="Can 5"/>
+          <p:cNvSpPr/>
+          <p:nvPr/>
+        </p:nvSpPr>
+        <p:spPr>
+          <a:xfrm>
+            <a:off x="1953390" y="4210749"/>
+            <a:ext cx="1125096" cy="1007819"/>
+          </a:xfrm>
+          <a:prstGeom prst="can">
+            <a:avLst/>
+          </a:prstGeom>
+          <a:ln>
+            <a:solidFill>
+              <a:schemeClr val="bg1"/>
+            </a:solidFill>
+          </a:ln>
+        </p:spPr>
+        <p:style>
+          <a:lnRef idx="2">
+            <a:schemeClr val="accent1">
+              <a:shade val="50000"/>
+            </a:schemeClr>
+          </a:lnRef>
+          <a:fillRef idx="1">
+            <a:schemeClr val="accent1"/>
+          </a:fillRef>
+          <a:effectRef idx="0">
+            <a:schemeClr val="accent1"/>
+          </a:effectRef>
+          <a:fontRef idx="minor">
+            <a:schemeClr val="lt1"/>
+          </a:fontRef>
+        </p:style>
+        <p:txBody>
+          <a:bodyPr rtlCol="0" anchor="ctr"/>
+          <a:lstStyle/>
+          <a:p>
+            <a:pPr algn="ctr"/>
+            <a:r>
+              <a:rPr lang="en-US" dirty="0" smtClean="0">
+                <a:solidFill>
+                  <a:schemeClr val="accent5">
+                    <a:lumMod val="60000"/>
+                    <a:lumOff val="40000"/>
+                  </a:schemeClr>
+                </a:solidFill>
+              </a:rPr>
+              <a:t>Mongo</a:t>
+            </a:r>
+            <a:r>
+              <a:rPr lang="en-US" dirty="0" smtClean="0">
+                <a:solidFill>
+                  <a:schemeClr val="bg1"/>
+                </a:solidFill>
+              </a:rPr>
+              <a:t>DB</a:t>
+            </a:r>
+            <a:endParaRPr lang="en-US" dirty="0">
+              <a:solidFill>
+                <a:schemeClr val="bg1"/>
+              </a:solidFill>
+            </a:endParaRPr>
+          </a:p>
+        </p:txBody>
+      </p:sp>
+      <p:sp>
+        <p:nvSpPr>
+          <p:cNvPr id="7" name="TextBox 6"/>
+          <p:cNvSpPr txBox="1"/>
+          <p:nvPr/>
+        </p:nvSpPr>
+        <p:spPr>
+          <a:xfrm>
+            <a:off x="814487" y="2943154"/>
+            <a:ext cx="2816194" cy="1015663"/>
+          </a:xfrm>
+          <a:prstGeom prst="rect">
+            <a:avLst/>
+          </a:prstGeom>
+          <a:noFill/>
+        </p:spPr>
+        <p:txBody>
+          <a:bodyPr wrap="square" rtlCol="0">
+            <a:spAutoFit/>
+          </a:bodyPr>
+          <a:lstStyle/>
+          <a:p>
+            <a:pPr algn="ctr"/>
+            <a:r>
+              <a:rPr lang="en-US" sz="2400" dirty="0" smtClean="0">
+                <a:solidFill>
+                  <a:schemeClr val="bg1"/>
+                </a:solidFill>
+              </a:rPr>
+              <a:t>API</a:t>
+            </a:r>
+          </a:p>
+          <a:p>
+            <a:pPr algn="ctr"/>
+            <a:r>
+              <a:rPr lang="en-US" dirty="0" smtClean="0">
+                <a:solidFill>
+                  <a:schemeClr val="accent5">
+                    <a:lumMod val="60000"/>
+                    <a:lumOff val="40000"/>
+                  </a:schemeClr>
+                </a:solidFill>
+              </a:rPr>
+              <a:t>Express.js / Node.js </a:t>
+            </a:r>
+          </a:p>
+          <a:p>
+            <a:endParaRPr lang="en-US" dirty="0"/>
+          </a:p>
+        </p:txBody>
+      </p:sp>
+      <p:cxnSp>
+        <p:nvCxnSpPr>
+          <p:cNvPr id="9" name="Straight Arrow Connector 8"/>
+          <p:cNvCxnSpPr/>
+          <p:nvPr/>
+        </p:nvCxnSpPr>
+        <p:spPr>
+          <a:xfrm>
+            <a:off x="2816193" y="3851801"/>
+            <a:ext cx="0" cy="358948"/>
+          </a:xfrm>
+          <a:prstGeom prst="straightConnector1">
+            <a:avLst/>
+          </a:prstGeom>
+          <a:ln>
+            <a:tailEnd type="arrow"/>
+          </a:ln>
+        </p:spPr>
+        <p:style>
+          <a:lnRef idx="2">
+            <a:schemeClr val="dk1"/>
+          </a:lnRef>
+          <a:fillRef idx="0">
+            <a:schemeClr val="dk1"/>
+          </a:fillRef>
+          <a:effectRef idx="1">
+            <a:schemeClr val="dk1"/>
+          </a:effectRef>
+          <a:fontRef idx="minor">
+            <a:schemeClr val="tx1"/>
+          </a:fontRef>
+        </p:style>
+      </p:cxnSp>
+      <p:cxnSp>
+        <p:nvCxnSpPr>
+          <p:cNvPr id="10" name="Straight Arrow Connector 9"/>
+          <p:cNvCxnSpPr/>
+          <p:nvPr/>
+        </p:nvCxnSpPr>
+        <p:spPr>
+          <a:xfrm flipV="1">
+            <a:off x="2305959" y="3851801"/>
+            <a:ext cx="0" cy="318605"/>
+          </a:xfrm>
+          <a:prstGeom prst="straightConnector1">
+            <a:avLst/>
+          </a:prstGeom>
+          <a:ln>
+            <a:tailEnd type="arrow"/>
+          </a:ln>
+        </p:spPr>
+        <p:style>
+          <a:lnRef idx="2">
+            <a:schemeClr val="dk1"/>
+          </a:lnRef>
+          <a:fillRef idx="0">
+            <a:schemeClr val="dk1"/>
+          </a:fillRef>
+          <a:effectRef idx="1">
+            <a:schemeClr val="dk1"/>
+          </a:effectRef>
+          <a:fontRef idx="minor">
+            <a:schemeClr val="tx1"/>
+          </a:fontRef>
+        </p:style>
+      </p:cxnSp>
+      <p:sp>
+        <p:nvSpPr>
+          <p:cNvPr id="12" name="TextBox 11"/>
+          <p:cNvSpPr txBox="1"/>
+          <p:nvPr/>
+        </p:nvSpPr>
+        <p:spPr>
+          <a:xfrm>
+            <a:off x="345122" y="2471227"/>
+            <a:ext cx="1090584" cy="369332"/>
+          </a:xfrm>
+          <a:prstGeom prst="rect">
+            <a:avLst/>
+          </a:prstGeom>
+          <a:noFill/>
+        </p:spPr>
+        <p:txBody>
+          <a:bodyPr wrap="square" rtlCol="0">
+            <a:spAutoFit/>
+          </a:bodyPr>
+          <a:lstStyle/>
+          <a:p>
+            <a:r>
+              <a:rPr lang="en-US" dirty="0" smtClean="0">
+                <a:solidFill>
+                  <a:schemeClr val="bg1"/>
+                </a:solidFill>
+              </a:rPr>
+              <a:t>Backend</a:t>
+            </a:r>
+            <a:endParaRPr lang="en-US" dirty="0">
+              <a:solidFill>
+                <a:schemeClr val="bg1"/>
+              </a:solidFill>
+            </a:endParaRPr>
+          </a:p>
+        </p:txBody>
+      </p:sp>
+      <p:sp>
+        <p:nvSpPr>
+          <p:cNvPr id="13" name="Rectangle 12"/>
+          <p:cNvSpPr/>
+          <p:nvPr/>
+        </p:nvSpPr>
+        <p:spPr>
+          <a:xfrm>
+            <a:off x="234681" y="358949"/>
+            <a:ext cx="5549559" cy="1487661"/>
+          </a:xfrm>
+          <a:prstGeom prst="rect">
+            <a:avLst/>
+          </a:prstGeom>
+          <a:solidFill>
+            <a:srgbClr val="CA3F52"/>
+          </a:solidFill>
+        </p:spPr>
+        <p:style>
+          <a:lnRef idx="1">
+            <a:schemeClr val="accent2"/>
+          </a:lnRef>
+          <a:fillRef idx="2">
+            <a:schemeClr val="accent2"/>
+          </a:fillRef>
+          <a:effectRef idx="1">
+            <a:schemeClr val="accent2"/>
+          </a:effectRef>
+          <a:fontRef idx="minor">
+            <a:schemeClr val="dk1"/>
+          </a:fontRef>
+        </p:style>
+        <p:txBody>
+          <a:bodyPr rtlCol="0" anchor="ctr"/>
+          <a:lstStyle/>
+          <a:p>
+            <a:pPr algn="ctr"/>
+            <a:endParaRPr lang="en-US" dirty="0">
+              <a:solidFill>
+                <a:srgbClr val="FFFFFF"/>
+              </a:solidFill>
+            </a:endParaRPr>
+          </a:p>
+        </p:txBody>
+      </p:sp>
+      <p:sp>
+        <p:nvSpPr>
+          <p:cNvPr id="15" name="TextBox 14"/>
+          <p:cNvSpPr txBox="1"/>
+          <p:nvPr/>
+        </p:nvSpPr>
+        <p:spPr>
+          <a:xfrm>
+            <a:off x="345122" y="455584"/>
+            <a:ext cx="1090584" cy="369332"/>
+          </a:xfrm>
+          <a:prstGeom prst="rect">
+            <a:avLst/>
+          </a:prstGeom>
+          <a:noFill/>
+        </p:spPr>
+        <p:txBody>
+          <a:bodyPr wrap="square" rtlCol="0">
+            <a:spAutoFit/>
+          </a:bodyPr>
+          <a:lstStyle/>
+          <a:p>
+            <a:r>
+              <a:rPr lang="en-US" dirty="0" smtClean="0">
+                <a:solidFill>
+                  <a:srgbClr val="FFFFFF"/>
+                </a:solidFill>
+              </a:rPr>
+              <a:t>Frontend</a:t>
+            </a:r>
+            <a:endParaRPr lang="en-US" dirty="0">
+              <a:solidFill>
+                <a:srgbClr val="FFFFFF"/>
+              </a:solidFill>
+            </a:endParaRPr>
+          </a:p>
+        </p:txBody>
+      </p:sp>
+      <p:cxnSp>
+        <p:nvCxnSpPr>
+          <p:cNvPr id="16" name="Straight Arrow Connector 15"/>
+          <p:cNvCxnSpPr/>
+          <p:nvPr/>
+        </p:nvCxnSpPr>
+        <p:spPr>
+          <a:xfrm>
+            <a:off x="1917013" y="1557158"/>
+            <a:ext cx="37469" cy="1369652"/>
+          </a:xfrm>
+          <a:prstGeom prst="straightConnector1">
+            <a:avLst/>
+          </a:prstGeom>
+          <a:ln>
+            <a:tailEnd type="arrow"/>
+          </a:ln>
+        </p:spPr>
+        <p:style>
+          <a:lnRef idx="2">
+            <a:schemeClr val="dk1"/>
+          </a:lnRef>
+          <a:fillRef idx="0">
+            <a:schemeClr val="dk1"/>
+          </a:fillRef>
+          <a:effectRef idx="1">
+            <a:schemeClr val="dk1"/>
+          </a:effectRef>
+          <a:fontRef idx="minor">
+            <a:schemeClr val="tx1"/>
+          </a:fontRef>
+        </p:style>
+      </p:cxnSp>
+      <p:cxnSp>
+        <p:nvCxnSpPr>
+          <p:cNvPr id="18" name="Straight Arrow Connector 17"/>
+          <p:cNvCxnSpPr/>
+          <p:nvPr/>
+        </p:nvCxnSpPr>
+        <p:spPr>
+          <a:xfrm flipH="1" flipV="1">
+            <a:off x="2526291" y="1587937"/>
+            <a:ext cx="2" cy="1338873"/>
+          </a:xfrm>
+          <a:prstGeom prst="straightConnector1">
+            <a:avLst/>
+          </a:prstGeom>
+          <a:ln>
+            <a:tailEnd type="arrow"/>
+          </a:ln>
+        </p:spPr>
+        <p:style>
+          <a:lnRef idx="2">
+            <a:schemeClr val="dk1"/>
+          </a:lnRef>
+          <a:fillRef idx="0">
+            <a:schemeClr val="dk1"/>
+          </a:fillRef>
+          <a:effectRef idx="1">
+            <a:schemeClr val="dk1"/>
+          </a:effectRef>
+          <a:fontRef idx="minor">
+            <a:schemeClr val="tx1"/>
+          </a:fontRef>
+        </p:style>
+      </p:cxnSp>
+      <p:sp>
+        <p:nvSpPr>
+          <p:cNvPr id="21" name="TextBox 20"/>
+          <p:cNvSpPr txBox="1"/>
+          <p:nvPr/>
+        </p:nvSpPr>
+        <p:spPr>
+          <a:xfrm rot="5400000">
+            <a:off x="2163966" y="2167501"/>
+            <a:ext cx="1021560" cy="369332"/>
+          </a:xfrm>
+          <a:prstGeom prst="rect">
+            <a:avLst/>
+          </a:prstGeom>
+          <a:noFill/>
+        </p:spPr>
+        <p:txBody>
+          <a:bodyPr wrap="square" rtlCol="0">
+            <a:spAutoFit/>
+          </a:bodyPr>
+          <a:lstStyle/>
+          <a:p>
+            <a:r>
+              <a:rPr lang="en-US" dirty="0" smtClean="0"/>
+              <a:t>JSON</a:t>
+            </a:r>
+            <a:endParaRPr lang="en-US" dirty="0"/>
+          </a:p>
+        </p:txBody>
+      </p:sp>
+      <p:sp>
+        <p:nvSpPr>
+          <p:cNvPr id="22" name="TextBox 21"/>
+          <p:cNvSpPr txBox="1"/>
+          <p:nvPr/>
+        </p:nvSpPr>
+        <p:spPr>
+          <a:xfrm rot="5400000">
+            <a:off x="1590899" y="2172725"/>
+            <a:ext cx="1021560" cy="369332"/>
+          </a:xfrm>
+          <a:prstGeom prst="rect">
+            <a:avLst/>
+          </a:prstGeom>
+          <a:noFill/>
+        </p:spPr>
+        <p:txBody>
+          <a:bodyPr wrap="square" rtlCol="0">
+            <a:spAutoFit/>
+          </a:bodyPr>
+          <a:lstStyle/>
+          <a:p>
+            <a:r>
+              <a:rPr lang="en-US" dirty="0" smtClean="0"/>
+              <a:t>HTTP</a:t>
+            </a:r>
+            <a:endParaRPr lang="en-US" dirty="0"/>
+          </a:p>
+        </p:txBody>
+      </p:sp>
+      <p:sp>
+        <p:nvSpPr>
+          <p:cNvPr id="23" name="Rectangle 22"/>
+          <p:cNvSpPr/>
+          <p:nvPr/>
+        </p:nvSpPr>
+        <p:spPr>
+          <a:xfrm>
+            <a:off x="966340" y="824917"/>
+            <a:ext cx="2912827" cy="763020"/>
+          </a:xfrm>
+          <a:prstGeom prst="rect">
+            <a:avLst/>
+          </a:prstGeom>
+          <a:solidFill>
+            <a:srgbClr val="FF685F"/>
+          </a:solidFill>
+          <a:ln>
+            <a:solidFill>
+              <a:srgbClr val="FFFFFF"/>
+            </a:solidFill>
+          </a:ln>
+        </p:spPr>
+        <p:style>
+          <a:lnRef idx="1">
+            <a:schemeClr val="accent2"/>
+          </a:lnRef>
+          <a:fillRef idx="2">
+            <a:schemeClr val="accent2"/>
+          </a:fillRef>
+          <a:effectRef idx="1">
+            <a:schemeClr val="accent2"/>
+          </a:effectRef>
+          <a:fontRef idx="minor">
+            <a:schemeClr val="dk1"/>
+          </a:fontRef>
+        </p:style>
+        <p:txBody>
+          <a:bodyPr rtlCol="0" anchor="ctr"/>
+          <a:lstStyle/>
+          <a:p>
+            <a:pPr algn="ctr"/>
+            <a:endParaRPr lang="en-US" dirty="0">
+              <a:solidFill>
+                <a:srgbClr val="FFFFFF"/>
+              </a:solidFill>
+            </a:endParaRPr>
+          </a:p>
+        </p:txBody>
+      </p:sp>
+      <p:sp>
+        <p:nvSpPr>
+          <p:cNvPr id="14" name="TextBox 13"/>
+          <p:cNvSpPr txBox="1"/>
+          <p:nvPr/>
+        </p:nvSpPr>
+        <p:spPr>
+          <a:xfrm>
+            <a:off x="1049170" y="1187826"/>
+            <a:ext cx="2829997" cy="369332"/>
+          </a:xfrm>
+          <a:prstGeom prst="rect">
+            <a:avLst/>
+          </a:prstGeom>
+          <a:noFill/>
+        </p:spPr>
+        <p:txBody>
+          <a:bodyPr wrap="square" rtlCol="0">
+            <a:spAutoFit/>
+          </a:bodyPr>
+          <a:lstStyle/>
+          <a:p>
+            <a:r>
+              <a:rPr lang="en-US" dirty="0" smtClean="0">
+                <a:solidFill>
+                  <a:srgbClr val="FFB1AE"/>
+                </a:solidFill>
+              </a:rPr>
+              <a:t>HTML/Bootstrap/</a:t>
+            </a:r>
+            <a:r>
+              <a:rPr lang="en-US" dirty="0" err="1" smtClean="0">
+                <a:solidFill>
+                  <a:srgbClr val="FFB1AE"/>
+                </a:solidFill>
+              </a:rPr>
+              <a:t>AngularJS</a:t>
+            </a:r>
+            <a:endParaRPr lang="en-US" sz="2000" dirty="0">
+              <a:solidFill>
+                <a:srgbClr val="FFB1AE"/>
+              </a:solidFill>
+            </a:endParaRPr>
+          </a:p>
+        </p:txBody>
+      </p:sp>
+      <p:sp>
+        <p:nvSpPr>
+          <p:cNvPr id="24" name="TextBox 23"/>
+          <p:cNvSpPr txBox="1"/>
+          <p:nvPr/>
+        </p:nvSpPr>
+        <p:spPr>
+          <a:xfrm>
+            <a:off x="1954482" y="810848"/>
+            <a:ext cx="1161473" cy="523220"/>
+          </a:xfrm>
+          <a:prstGeom prst="rect">
+            <a:avLst/>
+          </a:prstGeom>
+          <a:noFill/>
+          <a:ln>
+            <a:noFill/>
+          </a:ln>
+        </p:spPr>
+        <p:txBody>
+          <a:bodyPr wrap="square" rtlCol="0">
+            <a:spAutoFit/>
+          </a:bodyPr>
+          <a:lstStyle/>
+          <a:p>
+            <a:r>
+              <a:rPr lang="en-US" sz="2800" dirty="0" smtClean="0">
+                <a:solidFill>
+                  <a:schemeClr val="bg1"/>
+                </a:solidFill>
+              </a:rPr>
+              <a:t>UI</a:t>
+            </a:r>
+            <a:endParaRPr lang="en-US" dirty="0">
+              <a:solidFill>
+                <a:schemeClr val="bg1"/>
+              </a:solidFill>
+            </a:endParaRPr>
+          </a:p>
+        </p:txBody>
+      </p:sp>
+      <p:grpSp>
+        <p:nvGrpSpPr>
+          <p:cNvPr id="37" name="Group 36"/>
+          <p:cNvGrpSpPr/>
+          <p:nvPr/>
+        </p:nvGrpSpPr>
+        <p:grpSpPr>
+          <a:xfrm>
+            <a:off x="4528000" y="2982058"/>
+            <a:ext cx="1131998" cy="811087"/>
+            <a:chOff x="4528000" y="3175342"/>
+            <a:chExt cx="1131998" cy="811087"/>
+          </a:xfrm>
+        </p:grpSpPr>
+        <p:sp>
+          <p:nvSpPr>
+            <p:cNvPr id="29" name="Rectangle 28"/>
+            <p:cNvSpPr/>
+            <p:nvPr/>
+          </p:nvSpPr>
+          <p:spPr>
+            <a:xfrm>
+              <a:off x="4528000" y="3175342"/>
+              <a:ext cx="1131998" cy="811087"/>
+            </a:xfrm>
+            <a:prstGeom prst="rect">
+              <a:avLst/>
+            </a:prstGeom>
+            <a:solidFill>
+              <a:schemeClr val="bg1"/>
+            </a:solidFill>
+          </p:spPr>
+          <p:style>
+            <a:lnRef idx="1">
+              <a:schemeClr val="accent1"/>
+            </a:lnRef>
+            <a:fillRef idx="3">
+              <a:schemeClr val="accent1"/>
+            </a:fillRef>
+            <a:effectRef idx="2">
+              <a:schemeClr val="accent1"/>
+            </a:effectRef>
+            <a:fontRef idx="minor">
+              <a:schemeClr val="lt1"/>
+            </a:fontRef>
+          </p:style>
+          <p:txBody>
+            <a:bodyPr rtlCol="0" anchor="ctr"/>
+            <a:lstStyle/>
+            <a:p>
+              <a:pPr algn="ctr"/>
+              <a:endParaRPr lang="en-US"/>
+            </a:p>
+          </p:txBody>
+        </p:sp>
+        <p:pic>
+          <p:nvPicPr>
+            <p:cNvPr id="28" name="Picture 27" descr="yelp_logo11.jpg"/>
+            <p:cNvPicPr>
+              <a:picLocks noChangeAspect="1"/>
+            </p:cNvPicPr>
+            <p:nvPr/>
+          </p:nvPicPr>
+          <p:blipFill>
+            <a:blip r:embed="rId2">
+              <a:extLst>
+                <a:ext uri="{28A0092B-C50C-407E-A947-70E740481C1C}">
+                  <a14:useLocalDpi xmlns:a14="http://schemas.microsoft.com/office/drawing/2010/main" val="0"/>
+                </a:ext>
+              </a:extLst>
+            </a:blip>
+            <a:stretch>
+              <a:fillRect/>
+            </a:stretch>
+          </p:blipFill>
+          <p:spPr>
+            <a:xfrm>
+              <a:off x="4569413" y="3216760"/>
+              <a:ext cx="1049170" cy="742057"/>
+            </a:xfrm>
+            <a:prstGeom prst="rect">
+              <a:avLst/>
+            </a:prstGeom>
+          </p:spPr>
+        </p:pic>
+      </p:grpSp>
+      <p:cxnSp>
+        <p:nvCxnSpPr>
+          <p:cNvPr id="30" name="Straight Arrow Connector 29"/>
+          <p:cNvCxnSpPr/>
+          <p:nvPr/>
+        </p:nvCxnSpPr>
+        <p:spPr>
+          <a:xfrm>
+            <a:off x="3879169" y="3175858"/>
+            <a:ext cx="648830" cy="0"/>
+          </a:xfrm>
+          <a:prstGeom prst="straightConnector1">
+            <a:avLst/>
+          </a:prstGeom>
+          <a:ln>
+            <a:tailEnd type="arrow"/>
+          </a:ln>
+        </p:spPr>
+        <p:style>
+          <a:lnRef idx="2">
+            <a:schemeClr val="dk1"/>
+          </a:lnRef>
+          <a:fillRef idx="0">
+            <a:schemeClr val="dk1"/>
+          </a:fillRef>
+          <a:effectRef idx="1">
+            <a:schemeClr val="dk1"/>
+          </a:effectRef>
+          <a:fontRef idx="minor">
+            <a:schemeClr val="tx1"/>
+          </a:fontRef>
+        </p:style>
+      </p:cxnSp>
+      <p:cxnSp>
+        <p:nvCxnSpPr>
+          <p:cNvPr id="34" name="Straight Arrow Connector 33"/>
+          <p:cNvCxnSpPr/>
+          <p:nvPr/>
+        </p:nvCxnSpPr>
+        <p:spPr>
+          <a:xfrm flipH="1">
+            <a:off x="3879170" y="3425969"/>
+            <a:ext cx="648829" cy="0"/>
+          </a:xfrm>
+          <a:prstGeom prst="straightConnector1">
+            <a:avLst/>
+          </a:prstGeom>
+          <a:ln>
+            <a:tailEnd type="arrow"/>
+          </a:ln>
+        </p:spPr>
+        <p:style>
+          <a:lnRef idx="2">
+            <a:schemeClr val="dk1"/>
+          </a:lnRef>
+          <a:fillRef idx="0">
+            <a:schemeClr val="dk1"/>
+          </a:fillRef>
+          <a:effectRef idx="1">
+            <a:schemeClr val="dk1"/>
+          </a:effectRef>
+          <a:fontRef idx="minor">
+            <a:schemeClr val="tx1"/>
+          </a:fontRef>
+        </p:style>
+      </p:cxnSp>
+      <p:sp>
+        <p:nvSpPr>
+          <p:cNvPr id="40" name="TextBox 39"/>
+          <p:cNvSpPr txBox="1"/>
+          <p:nvPr/>
+        </p:nvSpPr>
+        <p:spPr>
+          <a:xfrm>
+            <a:off x="3832553" y="2854358"/>
+            <a:ext cx="1021560" cy="369332"/>
+          </a:xfrm>
+          <a:prstGeom prst="rect">
+            <a:avLst/>
+          </a:prstGeom>
+          <a:noFill/>
+        </p:spPr>
+        <p:txBody>
+          <a:bodyPr wrap="square" rtlCol="0">
+            <a:spAutoFit/>
+          </a:bodyPr>
+          <a:lstStyle/>
+          <a:p>
+            <a:r>
+              <a:rPr lang="en-US" dirty="0" smtClean="0"/>
+              <a:t>HTTP</a:t>
+            </a:r>
+            <a:endParaRPr lang="en-US" dirty="0"/>
+          </a:p>
+        </p:txBody>
+      </p:sp>
+      <p:sp>
+        <p:nvSpPr>
+          <p:cNvPr id="41" name="TextBox 40"/>
+          <p:cNvSpPr txBox="1"/>
+          <p:nvPr/>
+        </p:nvSpPr>
+        <p:spPr>
+          <a:xfrm>
+            <a:off x="3832553" y="3428995"/>
+            <a:ext cx="1021560" cy="369332"/>
+          </a:xfrm>
+          <a:prstGeom prst="rect">
+            <a:avLst/>
+          </a:prstGeom>
+          <a:noFill/>
+        </p:spPr>
+        <p:txBody>
+          <a:bodyPr wrap="square" rtlCol="0">
+            <a:spAutoFit/>
+          </a:bodyPr>
+          <a:lstStyle/>
+          <a:p>
+            <a:r>
+              <a:rPr lang="en-US" dirty="0" smtClean="0"/>
+              <a:t>JSON</a:t>
+            </a:r>
+            <a:endParaRPr lang="en-US" dirty="0"/>
+          </a:p>
+        </p:txBody>
+      </p:sp>
+      <p:sp>
+        <p:nvSpPr>
+          <p:cNvPr id="3" name="Right Triangle 2"/>
+          <p:cNvSpPr/>
+          <p:nvPr/>
+        </p:nvSpPr>
+        <p:spPr>
+          <a:xfrm rot="12968973">
+            <a:off x="2278327" y="5529868"/>
+            <a:ext cx="1137741" cy="512582"/>
+          </a:xfrm>
+          <a:prstGeom prst="rtTriangle">
+            <a:avLst/>
+          </a:prstGeom>
+          <a:solidFill>
+            <a:srgbClr val="8FFFB6"/>
+          </a:solidFill>
+          <a:ln>
+            <a:noFill/>
+          </a:ln>
+        </p:spPr>
+        <p:style>
+          <a:lnRef idx="2">
+            <a:schemeClr val="accent1">
+              <a:shade val="50000"/>
+            </a:schemeClr>
+          </a:lnRef>
+          <a:fillRef idx="1">
+            <a:schemeClr val="accent1"/>
+          </a:fillRef>
+          <a:effectRef idx="0">
+            <a:schemeClr val="accent1"/>
+          </a:effectRef>
+          <a:fontRef idx="minor">
+            <a:schemeClr val="lt1"/>
+          </a:fontRef>
+        </p:style>
+        <p:txBody>
+          <a:bodyPr rtlCol="0" anchor="ctr"/>
+          <a:lstStyle/>
+          <a:p>
+            <a:pPr algn="ctr"/>
+            <a:endParaRPr lang="en-US"/>
+          </a:p>
+        </p:txBody>
+      </p:sp>
+      <p:sp>
+        <p:nvSpPr>
+          <p:cNvPr id="38" name="Right Triangle 37"/>
+          <p:cNvSpPr/>
+          <p:nvPr/>
+        </p:nvSpPr>
+        <p:spPr>
+          <a:xfrm rot="7632190">
+            <a:off x="5533377" y="893503"/>
+            <a:ext cx="854450" cy="303377"/>
+          </a:xfrm>
+          <a:prstGeom prst="rtTriangle">
+            <a:avLst/>
+          </a:prstGeom>
+          <a:solidFill>
+            <a:srgbClr val="8FFFB6"/>
+          </a:solidFill>
+          <a:ln>
+            <a:noFill/>
+          </a:ln>
+          <a:effectLst/>
+        </p:spPr>
+        <p:style>
+          <a:lnRef idx="1">
+            <a:schemeClr val="accent6"/>
+          </a:lnRef>
+          <a:fillRef idx="2">
+            <a:schemeClr val="accent6"/>
+          </a:fillRef>
+          <a:effectRef idx="1">
+            <a:schemeClr val="accent6"/>
+          </a:effectRef>
+          <a:fontRef idx="minor">
+            <a:schemeClr val="dk1"/>
+          </a:fontRef>
+        </p:style>
+        <p:txBody>
+          <a:bodyPr rtlCol="0" anchor="ctr"/>
+          <a:lstStyle/>
+          <a:p>
+            <a:pPr algn="ctr"/>
+            <a:endParaRPr lang="en-US"/>
+          </a:p>
+        </p:txBody>
+      </p:sp>
+      <p:grpSp>
+        <p:nvGrpSpPr>
+          <p:cNvPr id="25" name="Group 24"/>
+          <p:cNvGrpSpPr/>
+          <p:nvPr/>
+        </p:nvGrpSpPr>
+        <p:grpSpPr>
+          <a:xfrm>
+            <a:off x="5782055" y="2874231"/>
+            <a:ext cx="2705006" cy="1016402"/>
+            <a:chOff x="5782055" y="2874231"/>
+            <a:chExt cx="2705006" cy="1016402"/>
+          </a:xfrm>
+        </p:grpSpPr>
+        <p:grpSp>
+          <p:nvGrpSpPr>
+            <p:cNvPr id="20" name="Group 19"/>
+            <p:cNvGrpSpPr/>
+            <p:nvPr/>
+          </p:nvGrpSpPr>
+          <p:grpSpPr>
+            <a:xfrm>
+              <a:off x="5782055" y="2874231"/>
+              <a:ext cx="2705006" cy="1016402"/>
+              <a:chOff x="5902003" y="2857799"/>
+              <a:chExt cx="2705006" cy="1016402"/>
+            </a:xfrm>
+          </p:grpSpPr>
+          <p:sp>
+            <p:nvSpPr>
+              <p:cNvPr id="19" name="Rounded Rectangle 18"/>
+              <p:cNvSpPr/>
+              <p:nvPr/>
+            </p:nvSpPr>
+            <p:spPr>
+              <a:xfrm>
+                <a:off x="6098102" y="2857799"/>
+                <a:ext cx="2508907" cy="469395"/>
+              </a:xfrm>
+              <a:prstGeom prst="roundRect">
+                <a:avLst/>
+              </a:prstGeom>
+              <a:solidFill>
+                <a:srgbClr val="8FFFB6"/>
+              </a:solidFill>
+              <a:ln>
+                <a:noFill/>
+              </a:ln>
+              <a:effectLst/>
+            </p:spPr>
+            <p:style>
+              <a:lnRef idx="1">
+                <a:schemeClr val="accent1"/>
+              </a:lnRef>
+              <a:fillRef idx="3">
+                <a:schemeClr val="accent1"/>
+              </a:fillRef>
+              <a:effectRef idx="2">
+                <a:schemeClr val="accent1"/>
+              </a:effectRef>
+              <a:fontRef idx="minor">
+                <a:schemeClr val="lt1"/>
+              </a:fontRef>
+            </p:style>
+            <p:txBody>
+              <a:bodyPr rtlCol="0" anchor="ctr"/>
+              <a:lstStyle/>
+              <a:p>
+                <a:pPr algn="ctr"/>
+                <a:endParaRPr lang="en-US"/>
+              </a:p>
+            </p:txBody>
+          </p:sp>
+          <p:sp>
+            <p:nvSpPr>
+              <p:cNvPr id="32" name="Right Triangle 31"/>
+              <p:cNvSpPr/>
+              <p:nvPr/>
+            </p:nvSpPr>
+            <p:spPr>
+              <a:xfrm rot="7632190">
+                <a:off x="5747707" y="3174047"/>
+                <a:ext cx="854450" cy="545858"/>
+              </a:xfrm>
+              <a:prstGeom prst="rtTriangle">
+                <a:avLst/>
+              </a:prstGeom>
+              <a:solidFill>
+                <a:srgbClr val="8FFFB6"/>
+              </a:solidFill>
+              <a:ln>
+                <a:noFill/>
+              </a:ln>
+              <a:effectLst/>
+            </p:spPr>
+            <p:style>
+              <a:lnRef idx="1">
+                <a:schemeClr val="accent6"/>
+              </a:lnRef>
+              <a:fillRef idx="2">
+                <a:schemeClr val="accent6"/>
+              </a:fillRef>
+              <a:effectRef idx="1">
+                <a:schemeClr val="accent6"/>
+              </a:effectRef>
+              <a:fontRef idx="minor">
+                <a:schemeClr val="dk1"/>
+              </a:fontRef>
+            </p:style>
+            <p:txBody>
+              <a:bodyPr rtlCol="0" anchor="ctr"/>
+              <a:lstStyle/>
+              <a:p>
+                <a:pPr algn="ctr"/>
+                <a:endParaRPr lang="en-US"/>
+              </a:p>
+            </p:txBody>
+          </p:sp>
+        </p:grpSp>
+        <p:sp>
+          <p:nvSpPr>
+            <p:cNvPr id="11" name="TextBox 10"/>
+            <p:cNvSpPr txBox="1"/>
+            <p:nvPr/>
+          </p:nvSpPr>
+          <p:spPr>
+            <a:xfrm>
+              <a:off x="6257280" y="2926810"/>
+              <a:ext cx="1753218" cy="369332"/>
+            </a:xfrm>
+            <a:prstGeom prst="rect">
+              <a:avLst/>
+            </a:prstGeom>
+            <a:noFill/>
+          </p:spPr>
+          <p:txBody>
+            <a:bodyPr wrap="square" rtlCol="0">
+              <a:spAutoFit/>
+            </a:bodyPr>
+            <a:lstStyle/>
+            <a:p>
+              <a:r>
+                <a:rPr lang="en-US" dirty="0" smtClean="0"/>
+                <a:t>Restaurant Data</a:t>
+              </a:r>
+              <a:endParaRPr lang="en-US" dirty="0"/>
+            </a:p>
+          </p:txBody>
+        </p:sp>
+      </p:grpSp>
+      <p:sp>
+        <p:nvSpPr>
+          <p:cNvPr id="43" name="Rounded Rectangle 42"/>
+          <p:cNvSpPr/>
+          <p:nvPr/>
+        </p:nvSpPr>
+        <p:spPr>
+          <a:xfrm>
+            <a:off x="2950068" y="5854559"/>
+            <a:ext cx="3238690" cy="587991"/>
+          </a:xfrm>
+          <a:prstGeom prst="roundRect">
+            <a:avLst/>
+          </a:prstGeom>
+          <a:solidFill>
+            <a:srgbClr val="8FFFB6"/>
+          </a:solidFill>
+          <a:ln>
+            <a:noFill/>
+          </a:ln>
+          <a:effectLst/>
+        </p:spPr>
+        <p:style>
+          <a:lnRef idx="1">
+            <a:schemeClr val="accent1"/>
+          </a:lnRef>
+          <a:fillRef idx="3">
+            <a:schemeClr val="accent1"/>
+          </a:fillRef>
+          <a:effectRef idx="2">
+            <a:schemeClr val="accent1"/>
+          </a:effectRef>
+          <a:fontRef idx="minor">
+            <a:schemeClr val="lt1"/>
+          </a:fontRef>
+        </p:style>
+        <p:txBody>
+          <a:bodyPr rtlCol="0" anchor="ctr"/>
+          <a:lstStyle/>
+          <a:p>
+            <a:pPr algn="ctr"/>
+            <a:endParaRPr lang="en-US"/>
+          </a:p>
+        </p:txBody>
+      </p:sp>
+      <p:sp>
+        <p:nvSpPr>
+          <p:cNvPr id="35" name="TextBox 34"/>
+          <p:cNvSpPr txBox="1"/>
+          <p:nvPr/>
+        </p:nvSpPr>
+        <p:spPr>
+          <a:xfrm>
+            <a:off x="3115955" y="5954622"/>
+            <a:ext cx="2989144" cy="369332"/>
+          </a:xfrm>
+          <a:prstGeom prst="rect">
+            <a:avLst/>
+          </a:prstGeom>
+          <a:noFill/>
+        </p:spPr>
+        <p:txBody>
+          <a:bodyPr wrap="square" rtlCol="0">
+            <a:spAutoFit/>
+          </a:bodyPr>
+          <a:lstStyle/>
+          <a:p>
+            <a:r>
+              <a:rPr lang="en-US" dirty="0" smtClean="0"/>
+              <a:t>User &amp; Voting Session Data</a:t>
+            </a:r>
+            <a:endParaRPr lang="en-US" dirty="0"/>
+          </a:p>
+        </p:txBody>
+      </p:sp>
+      <p:sp>
+        <p:nvSpPr>
+          <p:cNvPr id="44" name="Rounded Rectangle 43"/>
+          <p:cNvSpPr/>
+          <p:nvPr/>
+        </p:nvSpPr>
+        <p:spPr>
+          <a:xfrm>
+            <a:off x="6105100" y="526119"/>
+            <a:ext cx="2108798" cy="469395"/>
+          </a:xfrm>
+          <a:prstGeom prst="roundRect">
+            <a:avLst/>
+          </a:prstGeom>
+          <a:solidFill>
+            <a:srgbClr val="8FFFB6"/>
+          </a:solidFill>
+          <a:ln>
+            <a:noFill/>
+          </a:ln>
+          <a:effectLst/>
+        </p:spPr>
+        <p:style>
+          <a:lnRef idx="1">
+            <a:schemeClr val="accent1"/>
+          </a:lnRef>
+          <a:fillRef idx="3">
+            <a:schemeClr val="accent1"/>
+          </a:fillRef>
+          <a:effectRef idx="2">
+            <a:schemeClr val="accent1"/>
+          </a:effectRef>
+          <a:fontRef idx="minor">
+            <a:schemeClr val="lt1"/>
+          </a:fontRef>
+        </p:style>
+        <p:txBody>
+          <a:bodyPr rtlCol="0" anchor="ctr"/>
+          <a:lstStyle/>
+          <a:p>
+            <a:pPr algn="ctr"/>
+            <a:endParaRPr lang="en-US"/>
+          </a:p>
+        </p:txBody>
+      </p:sp>
+      <p:sp>
+        <p:nvSpPr>
+          <p:cNvPr id="42" name="TextBox 41"/>
+          <p:cNvSpPr txBox="1"/>
+          <p:nvPr/>
+        </p:nvSpPr>
+        <p:spPr>
+          <a:xfrm>
+            <a:off x="6532875" y="590503"/>
+            <a:ext cx="1753218" cy="369332"/>
+          </a:xfrm>
+          <a:prstGeom prst="rect">
+            <a:avLst/>
+          </a:prstGeom>
+          <a:noFill/>
+        </p:spPr>
+        <p:txBody>
+          <a:bodyPr wrap="square" rtlCol="0">
+            <a:spAutoFit/>
+          </a:bodyPr>
+          <a:lstStyle/>
+          <a:p>
+            <a:r>
+              <a:rPr lang="en-US" dirty="0" smtClean="0"/>
+              <a:t>Browser</a:t>
+            </a:r>
+            <a:endParaRPr lang="en-US" dirty="0"/>
+          </a:p>
+        </p:txBody>
+      </p:sp>
+      <p:sp>
+        <p:nvSpPr>
+          <p:cNvPr id="45" name="Right Triangle 44"/>
+          <p:cNvSpPr/>
+          <p:nvPr/>
+        </p:nvSpPr>
+        <p:spPr>
+          <a:xfrm rot="7632190">
+            <a:off x="5461182" y="4680043"/>
+            <a:ext cx="854450" cy="303377"/>
+          </a:xfrm>
+          <a:prstGeom prst="rtTriangle">
+            <a:avLst/>
+          </a:prstGeom>
+          <a:solidFill>
+            <a:srgbClr val="8FFFB6"/>
+          </a:solidFill>
+          <a:ln>
+            <a:noFill/>
+          </a:ln>
+          <a:effectLst/>
+        </p:spPr>
+        <p:style>
+          <a:lnRef idx="1">
+            <a:schemeClr val="accent6"/>
+          </a:lnRef>
+          <a:fillRef idx="2">
+            <a:schemeClr val="accent6"/>
+          </a:fillRef>
+          <a:effectRef idx="1">
+            <a:schemeClr val="accent6"/>
+          </a:effectRef>
+          <a:fontRef idx="minor">
+            <a:schemeClr val="dk1"/>
+          </a:fontRef>
+        </p:style>
+        <p:txBody>
+          <a:bodyPr rtlCol="0" anchor="ctr"/>
+          <a:lstStyle/>
+          <a:p>
+            <a:pPr algn="ctr"/>
+            <a:endParaRPr lang="en-US"/>
+          </a:p>
+        </p:txBody>
+      </p:sp>
+      <p:sp>
+        <p:nvSpPr>
+          <p:cNvPr id="46" name="Rounded Rectangle 45"/>
+          <p:cNvSpPr/>
+          <p:nvPr/>
+        </p:nvSpPr>
+        <p:spPr>
+          <a:xfrm>
+            <a:off x="6032905" y="4312659"/>
+            <a:ext cx="2108798" cy="469395"/>
+          </a:xfrm>
+          <a:prstGeom prst="roundRect">
+            <a:avLst/>
+          </a:prstGeom>
+          <a:solidFill>
+            <a:srgbClr val="8FFFB6"/>
+          </a:solidFill>
+          <a:ln>
+            <a:noFill/>
+          </a:ln>
+          <a:effectLst/>
+        </p:spPr>
+        <p:style>
+          <a:lnRef idx="1">
+            <a:schemeClr val="accent1"/>
+          </a:lnRef>
+          <a:fillRef idx="3">
+            <a:schemeClr val="accent1"/>
+          </a:fillRef>
+          <a:effectRef idx="2">
+            <a:schemeClr val="accent1"/>
+          </a:effectRef>
+          <a:fontRef idx="minor">
+            <a:schemeClr val="lt1"/>
+          </a:fontRef>
+        </p:style>
+        <p:txBody>
+          <a:bodyPr rtlCol="0" anchor="ctr"/>
+          <a:lstStyle/>
+          <a:p>
+            <a:pPr algn="ctr"/>
+            <a:endParaRPr lang="en-US"/>
+          </a:p>
+        </p:txBody>
+      </p:sp>
+      <p:sp>
+        <p:nvSpPr>
+          <p:cNvPr id="47" name="TextBox 46"/>
+          <p:cNvSpPr txBox="1"/>
+          <p:nvPr/>
+        </p:nvSpPr>
+        <p:spPr>
+          <a:xfrm>
+            <a:off x="6530689" y="4377043"/>
+            <a:ext cx="1061989" cy="369332"/>
+          </a:xfrm>
+          <a:prstGeom prst="rect">
+            <a:avLst/>
+          </a:prstGeom>
+          <a:noFill/>
+        </p:spPr>
+        <p:txBody>
+          <a:bodyPr wrap="square" rtlCol="0">
+            <a:spAutoFit/>
+          </a:bodyPr>
+          <a:lstStyle/>
+          <a:p>
+            <a:r>
+              <a:rPr lang="en-US" dirty="0" smtClean="0"/>
+              <a:t>Server</a:t>
+            </a:r>
+            <a:endParaRPr lang="en-US" dirty="0"/>
+          </a:p>
+        </p:txBody>
+      </p:sp>
+    </p:spTree>
+    <p:extLst>
+      <p:ext uri="{BB962C8B-B14F-4D97-AF65-F5344CB8AC3E}">
+        <p14:creationId xmlns:p14="http://schemas.microsoft.com/office/powerpoint/2010/main" val="3541901828"/>
+      </p:ext>
+    </p:extLst>
+  </p:cSld>
+  <p:clrMapOvr>
+    <a:masterClrMapping/>
+  </p:clrMapOvr>
+</p:sld>
+</file>
+
+<file path=ppt/slides/slide3.xml><?xml version="1.0" encoding="utf-8"?>
+<p:sld xmlns:a="http://schemas.openxmlformats.org/drawingml/2006/main" xmlns:r="http://schemas.openxmlformats.org/officeDocument/2006/relationships" xmlns:p="http://schemas.openxmlformats.org/presentationml/2006/main">
+  <p:cSld>
+    <p:spTree>
+      <p:nvGrpSpPr>
+        <p:cNvPr id="1" name=""/>
+        <p:cNvGrpSpPr/>
+        <p:nvPr/>
+      </p:nvGrpSpPr>
+      <p:grpSpPr>
+        <a:xfrm>
+          <a:off x="0" y="0"/>
+          <a:ext cx="0" cy="0"/>
+          <a:chOff x="0" y="0"/>
+          <a:chExt cx="0" cy="0"/>
+        </a:xfrm>
+      </p:grpSpPr>
+      <p:sp>
+        <p:nvSpPr>
+          <p:cNvPr id="2" name="Title 1"/>
+          <p:cNvSpPr>
+            <a:spLocks noGrp="1"/>
+          </p:cNvSpPr>
+          <p:nvPr>
+            <p:ph type="title"/>
+          </p:nvPr>
+        </p:nvSpPr>
+        <p:spPr/>
+        <p:txBody>
+          <a:bodyPr/>
+          <a:lstStyle/>
+          <a:p>
+            <a:r>
+              <a:rPr lang="en-US" dirty="0" smtClean="0"/>
+              <a:t>UI Design Decisions</a:t>
+            </a:r>
+            <a:endParaRPr lang="en-US" dirty="0"/>
+          </a:p>
+        </p:txBody>
+      </p:sp>
+      <p:sp>
+        <p:nvSpPr>
+          <p:cNvPr id="3" name="Content Placeholder 2"/>
+          <p:cNvSpPr>
+            <a:spLocks noGrp="1"/>
+          </p:cNvSpPr>
+          <p:nvPr>
+            <p:ph idx="1"/>
+          </p:nvPr>
+        </p:nvSpPr>
+        <p:spPr/>
+        <p:txBody>
+          <a:bodyPr/>
+          <a:lstStyle/>
+          <a:p>
+            <a:r>
+              <a:rPr lang="en-US" dirty="0" smtClean="0"/>
+              <a:t>Client side rendering</a:t>
+            </a:r>
+          </a:p>
+          <a:p>
+            <a:r>
+              <a:rPr lang="en-US" dirty="0" smtClean="0"/>
+              <a:t>Single Page app</a:t>
+            </a:r>
+          </a:p>
+          <a:p>
+            <a:r>
+              <a:rPr lang="en-US" dirty="0" smtClean="0"/>
+              <a:t>Mobile first layout</a:t>
+            </a:r>
+          </a:p>
+          <a:p>
+            <a:r>
+              <a:rPr lang="en-US" dirty="0" smtClean="0"/>
+              <a:t>Real-time communication via </a:t>
+            </a:r>
+            <a:r>
+              <a:rPr lang="en-US" dirty="0" err="1" smtClean="0"/>
+              <a:t>Websockets</a:t>
+            </a:r>
+            <a:endParaRPr lang="en-US" dirty="0" smtClean="0"/>
+          </a:p>
+          <a:p>
+            <a:r>
+              <a:rPr lang="en-US" dirty="0" smtClean="0"/>
+              <a:t>Backend API consumption via AJAX</a:t>
+            </a:r>
+          </a:p>
+          <a:p>
+            <a:r>
+              <a:rPr lang="en-US" dirty="0" smtClean="0"/>
+              <a:t>Data transfer format JSON</a:t>
+            </a:r>
+          </a:p>
+          <a:p>
+            <a:endParaRPr lang="en-US" dirty="0" smtClean="0"/>
+          </a:p>
+          <a:p>
+            <a:pPr marL="0" indent="0">
+              <a:buNone/>
+            </a:pPr>
+            <a:endParaRPr lang="en-US" dirty="0" smtClean="0"/>
+          </a:p>
+          <a:p>
+            <a:pPr marL="0" indent="0">
+              <a:buNone/>
+            </a:pPr>
+            <a:endParaRPr lang="en-US" dirty="0"/>
+          </a:p>
+        </p:txBody>
+      </p:sp>
+    </p:spTree>
+    <p:extLst>
+      <p:ext uri="{BB962C8B-B14F-4D97-AF65-F5344CB8AC3E}">
+        <p14:creationId xmlns:p14="http://schemas.microsoft.com/office/powerpoint/2010/main" val="3129946890"/>
+      </p:ext>
+    </p:extLst>
+  </p:cSld>
+  <p:clrMapOvr>
+    <a:masterClrMapping/>
+  </p:clrMapOvr>
+</p:sld>
+</file>
+
+<file path=ppt/slides/slide4.xml><?xml version="1.0" encoding="utf-8"?>
+<p:sld xmlns:a="http://schemas.openxmlformats.org/drawingml/2006/main" xmlns:r="http://schemas.openxmlformats.org/officeDocument/2006/relationships" xmlns:p="http://schemas.openxmlformats.org/presentationml/2006/main">
+  <p:cSld>
+    <p:spTree>
+      <p:nvGrpSpPr>
+        <p:cNvPr id="1" name=""/>
+        <p:cNvGrpSpPr/>
+        <p:nvPr/>
+      </p:nvGrpSpPr>
+      <p:grpSpPr>
+        <a:xfrm>
+          <a:off x="0" y="0"/>
+          <a:ext cx="0" cy="0"/>
+          <a:chOff x="0" y="0"/>
+          <a:chExt cx="0" cy="0"/>
+        </a:xfrm>
+      </p:grpSpPr>
+      <p:sp>
+        <p:nvSpPr>
+          <p:cNvPr id="2" name="Title 1"/>
+          <p:cNvSpPr>
+            <a:spLocks noGrp="1"/>
+          </p:cNvSpPr>
+          <p:nvPr>
+            <p:ph type="title"/>
+          </p:nvPr>
+        </p:nvSpPr>
+        <p:spPr/>
+        <p:txBody>
+          <a:bodyPr/>
+          <a:lstStyle/>
+          <a:p>
+            <a:r>
+              <a:rPr lang="en-US" dirty="0" smtClean="0"/>
+              <a:t>Backend Design Desicions</a:t>
+            </a:r>
+            <a:endParaRPr lang="en-US" dirty="0"/>
+          </a:p>
+        </p:txBody>
+      </p:sp>
+      <p:sp>
+        <p:nvSpPr>
+          <p:cNvPr id="3" name="Content Placeholder 2"/>
+          <p:cNvSpPr>
+            <a:spLocks noGrp="1"/>
+          </p:cNvSpPr>
+          <p:nvPr>
+            <p:ph idx="1"/>
+          </p:nvPr>
+        </p:nvSpPr>
+        <p:spPr/>
+        <p:txBody>
+          <a:bodyPr/>
+          <a:lstStyle/>
+          <a:p>
+            <a:r>
+              <a:rPr lang="en-US" dirty="0" smtClean="0"/>
+              <a:t>100% Asynchronous Non-blocking Request/Response cycle.</a:t>
+            </a:r>
+          </a:p>
+          <a:p>
+            <a:r>
+              <a:rPr lang="en-US" dirty="0" err="1" smtClean="0"/>
+              <a:t>Websocket</a:t>
+            </a:r>
+            <a:r>
+              <a:rPr lang="en-US" dirty="0" smtClean="0"/>
+              <a:t> supported via </a:t>
+            </a:r>
+            <a:r>
+              <a:rPr lang="en-US" dirty="0" err="1" smtClean="0"/>
+              <a:t>SocketIO</a:t>
+            </a:r>
+            <a:endParaRPr lang="en-US" dirty="0" smtClean="0"/>
+          </a:p>
+          <a:p>
+            <a:r>
+              <a:rPr lang="en-US" dirty="0" err="1" smtClean="0"/>
+              <a:t>RESTful</a:t>
+            </a:r>
+            <a:r>
+              <a:rPr lang="en-US" dirty="0" smtClean="0"/>
+              <a:t> API design for client consumption.</a:t>
+            </a:r>
+          </a:p>
+          <a:p>
+            <a:r>
+              <a:rPr lang="en-US" dirty="0" smtClean="0"/>
+              <a:t>JSON data transfer format</a:t>
+            </a:r>
+          </a:p>
+          <a:p>
+            <a:r>
+              <a:rPr lang="en-US" dirty="0"/>
+              <a:t>U</a:t>
+            </a:r>
+            <a:r>
+              <a:rPr lang="en-US" dirty="0" smtClean="0"/>
+              <a:t>ser, voting sessions, and related metadata persisted in </a:t>
+            </a:r>
+            <a:r>
+              <a:rPr lang="en-US" dirty="0" err="1" smtClean="0"/>
+              <a:t>MongoDB</a:t>
+            </a:r>
+            <a:endParaRPr lang="en-US" dirty="0" smtClean="0"/>
+          </a:p>
+          <a:p>
+            <a:r>
+              <a:rPr lang="en-US" dirty="0" smtClean="0"/>
+              <a:t>Restaurant data retrieved from YELP API.</a:t>
+            </a:r>
+          </a:p>
+          <a:p>
+            <a:endParaRPr lang="en-US" dirty="0"/>
+          </a:p>
+        </p:txBody>
+      </p:sp>
+    </p:spTree>
+    <p:extLst>
+      <p:ext uri="{BB962C8B-B14F-4D97-AF65-F5344CB8AC3E}">
+        <p14:creationId xmlns:p14="http://schemas.microsoft.com/office/powerpoint/2010/main" val="3187036995"/>
+      </p:ext>
+    </p:extLst>
+  </p:cSld>
+  <p:clrMapOvr>
+    <a:masterClrMapping/>
+  </p:clrMapOvr>
+</p:sld>
+</file>
+
+<file path=ppt/slides/slide5.xml><?xml version="1.0" encoding="utf-8"?>
+<p:sld xmlns:a="http://schemas.openxmlformats.org/drawingml/2006/main" xmlns:r="http://schemas.openxmlformats.org/officeDocument/2006/relationships" xmlns:p="http://schemas.openxmlformats.org/presentationml/2006/main">
+  <p:cSld>
+    <p:spTree>
+      <p:nvGrpSpPr>
+        <p:cNvPr id="1" name=""/>
+        <p:cNvGrpSpPr/>
+        <p:nvPr/>
+      </p:nvGrpSpPr>
+      <p:grpSpPr>
+        <a:xfrm>
+          <a:off x="0" y="0"/>
+          <a:ext cx="0" cy="0"/>
+          <a:chOff x="0" y="0"/>
+          <a:chExt cx="0" cy="0"/>
+        </a:xfrm>
+      </p:grpSpPr>
+      <p:sp>
+        <p:nvSpPr>
+          <p:cNvPr id="2" name="Title 1"/>
+          <p:cNvSpPr>
+            <a:spLocks noGrp="1"/>
+          </p:cNvSpPr>
+          <p:nvPr>
+            <p:ph type="title"/>
+          </p:nvPr>
+        </p:nvSpPr>
+        <p:spPr/>
+        <p:txBody>
+          <a:bodyPr/>
+          <a:lstStyle/>
+          <a:p>
+            <a:r>
+              <a:rPr lang="en-US" dirty="0" smtClean="0"/>
+              <a:t>Mockups</a:t>
+            </a:r>
+            <a:endParaRPr lang="en-US" dirty="0"/>
+          </a:p>
+        </p:txBody>
+      </p:sp>
+      <p:sp>
+        <p:nvSpPr>
+          <p:cNvPr id="3" name="Content Placeholder 2"/>
+          <p:cNvSpPr>
+            <a:spLocks noGrp="1"/>
+          </p:cNvSpPr>
+          <p:nvPr>
+            <p:ph idx="1"/>
+          </p:nvPr>
+        </p:nvSpPr>
+        <p:spPr/>
+        <p:txBody>
+          <a:bodyPr/>
+          <a:lstStyle/>
+          <a:p>
+            <a:pPr marL="0" indent="0">
+              <a:buNone/>
+            </a:pPr>
+            <a:r>
+              <a:rPr lang="en-US" dirty="0" smtClean="0"/>
+              <a:t>// To do</a:t>
+            </a:r>
+            <a:endParaRPr lang="en-US" dirty="0"/>
+          </a:p>
+        </p:txBody>
+      </p:sp>
+    </p:spTree>
+    <p:extLst>
+      <p:ext uri="{BB962C8B-B14F-4D97-AF65-F5344CB8AC3E}">
+        <p14:creationId xmlns:p14="http://schemas.microsoft.com/office/powerpoint/2010/main" val="672435330"/>
       </p:ext>
     </p:extLst>
   </p:cSld>

</xml_diff>